<commit_message>
Agregar capturas de vistas a la presentacion
</commit_message>
<xml_diff>
--- a/Documentos aula virtual/Grupo 2 - Semana 2.pptx
+++ b/Documentos aula virtual/Grupo 2 - Semana 2.pptx
@@ -4,6 +4,9 @@
   <p:sldMasterIdLst>
     <p:sldMasterId id="2147483673" r:id="rId1"/>
   </p:sldMasterIdLst>
+  <p:notesMasterIdLst>
+    <p:notesMasterId r:id="rId12"/>
+  </p:notesMasterIdLst>
   <p:sldIdLst>
     <p:sldId id="256" r:id="rId2"/>
     <p:sldId id="257" r:id="rId3"/>
@@ -12,6 +15,9 @@
     <p:sldId id="260" r:id="rId6"/>
     <p:sldId id="261" r:id="rId7"/>
     <p:sldId id="262" r:id="rId8"/>
+    <p:sldId id="263" r:id="rId9"/>
+    <p:sldId id="264" r:id="rId10"/>
+    <p:sldId id="265" r:id="rId11"/>
   </p:sldIdLst>
   <p:sldSz cx="12192000" cy="6858000"/>
   <p:notesSz cx="6858000" cy="9144000"/>
@@ -118,6 +124,356 @@
 </p:presentation>
 </file>
 
+<file path=ppt/notesMasters/notesMaster1.xml><?xml version="1.0" encoding="utf-8"?>
+<p:notesMaster xmlns:a="http://schemas.openxmlformats.org/drawingml/2006/main" xmlns:r="http://schemas.openxmlformats.org/officeDocument/2006/relationships" xmlns:p="http://schemas.openxmlformats.org/presentationml/2006/main">
+  <p:cSld>
+    <p:bg>
+      <p:bgRef idx="1001">
+        <a:schemeClr val="bg1"/>
+      </p:bgRef>
+    </p:bg>
+    <p:spTree>
+      <p:nvGrpSpPr>
+        <p:cNvPr id="1" name=""/>
+        <p:cNvGrpSpPr/>
+        <p:nvPr/>
+      </p:nvGrpSpPr>
+      <p:grpSpPr>
+        <a:xfrm>
+          <a:off x="0" y="0"/>
+          <a:ext cx="0" cy="0"/>
+          <a:chOff x="0" y="0"/>
+          <a:chExt cx="0" cy="0"/>
+        </a:xfrm>
+      </p:grpSpPr>
+      <p:sp>
+        <p:nvSpPr>
+          <p:cNvPr id="2" name="Marcador de encabezado 1"/>
+          <p:cNvSpPr>
+            <a:spLocks noGrp="1"/>
+          </p:cNvSpPr>
+          <p:nvPr>
+            <p:ph type="hdr" sz="quarter"/>
+          </p:nvPr>
+        </p:nvSpPr>
+        <p:spPr>
+          <a:xfrm>
+            <a:off x="0" y="0"/>
+            <a:ext cx="2971800" cy="458788"/>
+          </a:xfrm>
+          <a:prstGeom prst="rect">
+            <a:avLst/>
+          </a:prstGeom>
+        </p:spPr>
+        <p:txBody>
+          <a:bodyPr vert="horz" lIns="91440" tIns="45720" rIns="91440" bIns="45720" rtlCol="0"/>
+          <a:lstStyle>
+            <a:lvl1pPr algn="l">
+              <a:defRPr sz="1200"/>
+            </a:lvl1pPr>
+          </a:lstStyle>
+          <a:p>
+            <a:endParaRPr lang="es-419"/>
+          </a:p>
+        </p:txBody>
+      </p:sp>
+      <p:sp>
+        <p:nvSpPr>
+          <p:cNvPr id="3" name="Marcador de fecha 2"/>
+          <p:cNvSpPr>
+            <a:spLocks noGrp="1"/>
+          </p:cNvSpPr>
+          <p:nvPr>
+            <p:ph type="dt" idx="1"/>
+          </p:nvPr>
+        </p:nvSpPr>
+        <p:spPr>
+          <a:xfrm>
+            <a:off x="3884613" y="0"/>
+            <a:ext cx="2971800" cy="458788"/>
+          </a:xfrm>
+          <a:prstGeom prst="rect">
+            <a:avLst/>
+          </a:prstGeom>
+        </p:spPr>
+        <p:txBody>
+          <a:bodyPr vert="horz" lIns="91440" tIns="45720" rIns="91440" bIns="45720" rtlCol="0"/>
+          <a:lstStyle>
+            <a:lvl1pPr algn="r">
+              <a:defRPr sz="1200"/>
+            </a:lvl1pPr>
+          </a:lstStyle>
+          <a:p>
+            <a:fld id="{A265FD30-954D-4D65-9CD6-C4FFED460B38}" type="datetimeFigureOut">
+              <a:rPr lang="es-419" smtClean="0"/>
+              <a:t>3/4/2022</a:t>
+            </a:fld>
+            <a:endParaRPr lang="es-419"/>
+          </a:p>
+        </p:txBody>
+      </p:sp>
+      <p:sp>
+        <p:nvSpPr>
+          <p:cNvPr id="4" name="Marcador de imagen de diapositiva 3"/>
+          <p:cNvSpPr>
+            <a:spLocks noGrp="1" noRot="1" noChangeAspect="1"/>
+          </p:cNvSpPr>
+          <p:nvPr>
+            <p:ph type="sldImg" idx="2"/>
+          </p:nvPr>
+        </p:nvSpPr>
+        <p:spPr>
+          <a:xfrm>
+            <a:off x="685800" y="1143000"/>
+            <a:ext cx="5486400" cy="3086100"/>
+          </a:xfrm>
+          <a:prstGeom prst="rect">
+            <a:avLst/>
+          </a:prstGeom>
+          <a:noFill/>
+          <a:ln w="12700">
+            <a:solidFill>
+              <a:prstClr val="black"/>
+            </a:solidFill>
+          </a:ln>
+        </p:spPr>
+        <p:txBody>
+          <a:bodyPr vert="horz" lIns="91440" tIns="45720" rIns="91440" bIns="45720" rtlCol="0" anchor="ctr"/>
+          <a:lstStyle/>
+          <a:p>
+            <a:endParaRPr lang="es-419"/>
+          </a:p>
+        </p:txBody>
+      </p:sp>
+      <p:sp>
+        <p:nvSpPr>
+          <p:cNvPr id="5" name="Marcador de notas 4"/>
+          <p:cNvSpPr>
+            <a:spLocks noGrp="1"/>
+          </p:cNvSpPr>
+          <p:nvPr>
+            <p:ph type="body" sz="quarter" idx="3"/>
+          </p:nvPr>
+        </p:nvSpPr>
+        <p:spPr>
+          <a:xfrm>
+            <a:off x="685800" y="4400550"/>
+            <a:ext cx="5486400" cy="3600450"/>
+          </a:xfrm>
+          <a:prstGeom prst="rect">
+            <a:avLst/>
+          </a:prstGeom>
+        </p:spPr>
+        <p:txBody>
+          <a:bodyPr vert="horz" lIns="91440" tIns="45720" rIns="91440" bIns="45720" rtlCol="0"/>
+          <a:lstStyle/>
+          <a:p>
+            <a:pPr lvl="0"/>
+            <a:r>
+              <a:rPr lang="es-ES"/>
+              <a:t>Haga clic para modificar los estilos de texto del patrón</a:t>
+            </a:r>
+          </a:p>
+          <a:p>
+            <a:pPr lvl="1"/>
+            <a:r>
+              <a:rPr lang="es-ES"/>
+              <a:t>Segundo nivel</a:t>
+            </a:r>
+          </a:p>
+          <a:p>
+            <a:pPr lvl="2"/>
+            <a:r>
+              <a:rPr lang="es-ES"/>
+              <a:t>Tercer nivel</a:t>
+            </a:r>
+          </a:p>
+          <a:p>
+            <a:pPr lvl="3"/>
+            <a:r>
+              <a:rPr lang="es-ES"/>
+              <a:t>Cuarto nivel</a:t>
+            </a:r>
+          </a:p>
+          <a:p>
+            <a:pPr lvl="4"/>
+            <a:r>
+              <a:rPr lang="es-ES"/>
+              <a:t>Quinto nivel</a:t>
+            </a:r>
+            <a:endParaRPr lang="es-419"/>
+          </a:p>
+        </p:txBody>
+      </p:sp>
+      <p:sp>
+        <p:nvSpPr>
+          <p:cNvPr id="6" name="Marcador de pie de página 5"/>
+          <p:cNvSpPr>
+            <a:spLocks noGrp="1"/>
+          </p:cNvSpPr>
+          <p:nvPr>
+            <p:ph type="ftr" sz="quarter" idx="4"/>
+          </p:nvPr>
+        </p:nvSpPr>
+        <p:spPr>
+          <a:xfrm>
+            <a:off x="0" y="8685213"/>
+            <a:ext cx="2971800" cy="458787"/>
+          </a:xfrm>
+          <a:prstGeom prst="rect">
+            <a:avLst/>
+          </a:prstGeom>
+        </p:spPr>
+        <p:txBody>
+          <a:bodyPr vert="horz" lIns="91440" tIns="45720" rIns="91440" bIns="45720" rtlCol="0" anchor="b"/>
+          <a:lstStyle>
+            <a:lvl1pPr algn="l">
+              <a:defRPr sz="1200"/>
+            </a:lvl1pPr>
+          </a:lstStyle>
+          <a:p>
+            <a:endParaRPr lang="es-419"/>
+          </a:p>
+        </p:txBody>
+      </p:sp>
+      <p:sp>
+        <p:nvSpPr>
+          <p:cNvPr id="7" name="Marcador de número de diapositiva 6"/>
+          <p:cNvSpPr>
+            <a:spLocks noGrp="1"/>
+          </p:cNvSpPr>
+          <p:nvPr>
+            <p:ph type="sldNum" sz="quarter" idx="5"/>
+          </p:nvPr>
+        </p:nvSpPr>
+        <p:spPr>
+          <a:xfrm>
+            <a:off x="3884613" y="8685213"/>
+            <a:ext cx="2971800" cy="458787"/>
+          </a:xfrm>
+          <a:prstGeom prst="rect">
+            <a:avLst/>
+          </a:prstGeom>
+        </p:spPr>
+        <p:txBody>
+          <a:bodyPr vert="horz" lIns="91440" tIns="45720" rIns="91440" bIns="45720" rtlCol="0" anchor="b"/>
+          <a:lstStyle>
+            <a:lvl1pPr algn="r">
+              <a:defRPr sz="1200"/>
+            </a:lvl1pPr>
+          </a:lstStyle>
+          <a:p>
+            <a:fld id="{A5598B80-0398-4595-822E-380B68C58B59}" type="slidenum">
+              <a:rPr lang="es-419" smtClean="0"/>
+              <a:t>‹Nº›</a:t>
+            </a:fld>
+            <a:endParaRPr lang="es-419"/>
+          </a:p>
+        </p:txBody>
+      </p:sp>
+    </p:spTree>
+    <p:extLst>
+      <p:ext uri="{BB962C8B-B14F-4D97-AF65-F5344CB8AC3E}">
+        <p14:creationId xmlns:p14="http://schemas.microsoft.com/office/powerpoint/2010/main" val="2297828778"/>
+      </p:ext>
+    </p:extLst>
+  </p:cSld>
+  <p:clrMap bg1="lt1" tx1="dk1" bg2="lt2" tx2="dk2" accent1="accent1" accent2="accent2" accent3="accent3" accent4="accent4" accent5="accent5" accent6="accent6" hlink="hlink" folHlink="folHlink"/>
+  <p:notesStyle>
+    <a:lvl1pPr marL="0" algn="l" defTabSz="914400" rtl="0" eaLnBrk="1" latinLnBrk="0" hangingPunct="1">
+      <a:defRPr sz="1200" kern="1200">
+        <a:solidFill>
+          <a:schemeClr val="tx1"/>
+        </a:solidFill>
+        <a:latin typeface="+mn-lt"/>
+        <a:ea typeface="+mn-ea"/>
+        <a:cs typeface="+mn-cs"/>
+      </a:defRPr>
+    </a:lvl1pPr>
+    <a:lvl2pPr marL="457200" algn="l" defTabSz="914400" rtl="0" eaLnBrk="1" latinLnBrk="0" hangingPunct="1">
+      <a:defRPr sz="1200" kern="1200">
+        <a:solidFill>
+          <a:schemeClr val="tx1"/>
+        </a:solidFill>
+        <a:latin typeface="+mn-lt"/>
+        <a:ea typeface="+mn-ea"/>
+        <a:cs typeface="+mn-cs"/>
+      </a:defRPr>
+    </a:lvl2pPr>
+    <a:lvl3pPr marL="914400" algn="l" defTabSz="914400" rtl="0" eaLnBrk="1" latinLnBrk="0" hangingPunct="1">
+      <a:defRPr sz="1200" kern="1200">
+        <a:solidFill>
+          <a:schemeClr val="tx1"/>
+        </a:solidFill>
+        <a:latin typeface="+mn-lt"/>
+        <a:ea typeface="+mn-ea"/>
+        <a:cs typeface="+mn-cs"/>
+      </a:defRPr>
+    </a:lvl3pPr>
+    <a:lvl4pPr marL="1371600" algn="l" defTabSz="914400" rtl="0" eaLnBrk="1" latinLnBrk="0" hangingPunct="1">
+      <a:defRPr sz="1200" kern="1200">
+        <a:solidFill>
+          <a:schemeClr val="tx1"/>
+        </a:solidFill>
+        <a:latin typeface="+mn-lt"/>
+        <a:ea typeface="+mn-ea"/>
+        <a:cs typeface="+mn-cs"/>
+      </a:defRPr>
+    </a:lvl4pPr>
+    <a:lvl5pPr marL="1828800" algn="l" defTabSz="914400" rtl="0" eaLnBrk="1" latinLnBrk="0" hangingPunct="1">
+      <a:defRPr sz="1200" kern="1200">
+        <a:solidFill>
+          <a:schemeClr val="tx1"/>
+        </a:solidFill>
+        <a:latin typeface="+mn-lt"/>
+        <a:ea typeface="+mn-ea"/>
+        <a:cs typeface="+mn-cs"/>
+      </a:defRPr>
+    </a:lvl5pPr>
+    <a:lvl6pPr marL="2286000" algn="l" defTabSz="914400" rtl="0" eaLnBrk="1" latinLnBrk="0" hangingPunct="1">
+      <a:defRPr sz="1200" kern="1200">
+        <a:solidFill>
+          <a:schemeClr val="tx1"/>
+        </a:solidFill>
+        <a:latin typeface="+mn-lt"/>
+        <a:ea typeface="+mn-ea"/>
+        <a:cs typeface="+mn-cs"/>
+      </a:defRPr>
+    </a:lvl6pPr>
+    <a:lvl7pPr marL="2743200" algn="l" defTabSz="914400" rtl="0" eaLnBrk="1" latinLnBrk="0" hangingPunct="1">
+      <a:defRPr sz="1200" kern="1200">
+        <a:solidFill>
+          <a:schemeClr val="tx1"/>
+        </a:solidFill>
+        <a:latin typeface="+mn-lt"/>
+        <a:ea typeface="+mn-ea"/>
+        <a:cs typeface="+mn-cs"/>
+      </a:defRPr>
+    </a:lvl7pPr>
+    <a:lvl8pPr marL="3200400" algn="l" defTabSz="914400" rtl="0" eaLnBrk="1" latinLnBrk="0" hangingPunct="1">
+      <a:defRPr sz="1200" kern="1200">
+        <a:solidFill>
+          <a:schemeClr val="tx1"/>
+        </a:solidFill>
+        <a:latin typeface="+mn-lt"/>
+        <a:ea typeface="+mn-ea"/>
+        <a:cs typeface="+mn-cs"/>
+      </a:defRPr>
+    </a:lvl8pPr>
+    <a:lvl9pPr marL="3657600" algn="l" defTabSz="914400" rtl="0" eaLnBrk="1" latinLnBrk="0" hangingPunct="1">
+      <a:defRPr sz="1200" kern="1200">
+        <a:solidFill>
+          <a:schemeClr val="tx1"/>
+        </a:solidFill>
+        <a:latin typeface="+mn-lt"/>
+        <a:ea typeface="+mn-ea"/>
+        <a:cs typeface="+mn-cs"/>
+      </a:defRPr>
+    </a:lvl9pPr>
+  </p:notesStyle>
+</p:notesMaster>
+</file>
+
 <file path=ppt/slideLayouts/slideLayout1.xml><?xml version="1.0" encoding="utf-8"?>
 <p:sldLayout xmlns:a="http://schemas.openxmlformats.org/drawingml/2006/main" xmlns:r="http://schemas.openxmlformats.org/officeDocument/2006/relationships" xmlns:p="http://schemas.openxmlformats.org/presentationml/2006/main" showMasterSp="0" type="title" preserve="1">
   <p:cSld name="Title Slide">
@@ -362,7 +718,7 @@
           <a:p>
             <a:fld id="{9184DA70-C731-4C70-880D-CCD4705E623C}" type="datetime1">
               <a:rPr lang="en-US" smtClean="0"/>
-              <a:t>4/3/2022</a:t>
+              <a:t>03-Apr-22</a:t>
             </a:fld>
             <a:endParaRPr lang="en-US" dirty="0"/>
           </a:p>
@@ -416,7 +772,7 @@
           <a:p>
             <a:fld id="{3A98EE3D-8CD1-4C3F-BD1C-C98C9596463C}" type="slidenum">
               <a:rPr lang="en-US" smtClean="0"/>
-              <a:t>‹#›</a:t>
+              <a:t>‹Nº›</a:t>
             </a:fld>
             <a:endParaRPr lang="en-US" dirty="0"/>
           </a:p>
@@ -550,7 +906,7 @@
           <a:p>
             <a:fld id="{B612A279-0833-481D-8C56-F67FD0AC6C50}" type="datetime1">
               <a:rPr lang="en-US" smtClean="0"/>
-              <a:t>4/3/2022</a:t>
+              <a:t>03-Apr-22</a:t>
             </a:fld>
             <a:endParaRPr lang="en-US" dirty="0"/>
           </a:p>
@@ -604,7 +960,7 @@
           <a:p>
             <a:fld id="{3A98EE3D-8CD1-4C3F-BD1C-C98C9596463C}" type="slidenum">
               <a:rPr lang="en-US" smtClean="0"/>
-              <a:t>‹#›</a:t>
+              <a:t>‹Nº›</a:t>
             </a:fld>
             <a:endParaRPr lang="en-US" dirty="0"/>
           </a:p>
@@ -792,7 +1148,7 @@
           <a:p>
             <a:fld id="{6587DA83-5663-4C9C-B9AA-0B40A3DAFF81}" type="datetime1">
               <a:rPr lang="en-US" smtClean="0"/>
-              <a:t>4/3/2022</a:t>
+              <a:t>03-Apr-22</a:t>
             </a:fld>
             <a:endParaRPr lang="en-US" dirty="0"/>
           </a:p>
@@ -846,7 +1202,7 @@
           <a:p>
             <a:fld id="{3A98EE3D-8CD1-4C3F-BD1C-C98C9596463C}" type="slidenum">
               <a:rPr lang="en-US" smtClean="0"/>
-              <a:t>‹#›</a:t>
+              <a:t>‹Nº›</a:t>
             </a:fld>
             <a:endParaRPr lang="en-US" dirty="0"/>
           </a:p>
@@ -980,7 +1336,7 @@
           <a:p>
             <a:fld id="{4BE1D723-8F53-4F53-90B0-1982A396982E}" type="datetime1">
               <a:rPr lang="en-US" smtClean="0"/>
-              <a:t>4/3/2022</a:t>
+              <a:t>03-Apr-22</a:t>
             </a:fld>
             <a:endParaRPr lang="en-US" dirty="0"/>
           </a:p>
@@ -1034,7 +1390,7 @@
           <a:p>
             <a:fld id="{3A98EE3D-8CD1-4C3F-BD1C-C98C9596463C}" type="slidenum">
               <a:rPr lang="en-US" smtClean="0"/>
-              <a:t>‹#›</a:t>
+              <a:t>‹Nº›</a:t>
             </a:fld>
             <a:endParaRPr lang="en-US" dirty="0"/>
           </a:p>
@@ -1353,7 +1709,7 @@
           <a:p>
             <a:fld id="{97669AF7-7BEB-44E4-9852-375E34362B5B}" type="datetime1">
               <a:rPr lang="en-US" smtClean="0"/>
-              <a:t>4/3/2022</a:t>
+              <a:t>03-Apr-22</a:t>
             </a:fld>
             <a:endParaRPr lang="en-US" dirty="0"/>
           </a:p>
@@ -1407,7 +1763,7 @@
           <a:p>
             <a:fld id="{3A98EE3D-8CD1-4C3F-BD1C-C98C9596463C}" type="slidenum">
               <a:rPr lang="en-US" smtClean="0"/>
-              <a:t>‹#›</a:t>
+              <a:t>‹Nº›</a:t>
             </a:fld>
             <a:endParaRPr lang="en-US" dirty="0"/>
           </a:p>
@@ -1608,7 +1964,7 @@
           <a:p>
             <a:fld id="{BAAAC38D-0552-4C82-B593-E6124DFADBE2}" type="datetime1">
               <a:rPr lang="en-US" smtClean="0"/>
-              <a:t>4/3/2022</a:t>
+              <a:t>03-Apr-22</a:t>
             </a:fld>
             <a:endParaRPr lang="en-US" dirty="0"/>
           </a:p>
@@ -1662,7 +2018,7 @@
           <a:p>
             <a:fld id="{3A98EE3D-8CD1-4C3F-BD1C-C98C9596463C}" type="slidenum">
               <a:rPr lang="en-US" smtClean="0"/>
-              <a:t>‹#›</a:t>
+              <a:t>‹Nº›</a:t>
             </a:fld>
             <a:endParaRPr lang="en-US" dirty="0"/>
           </a:p>
@@ -2005,7 +2361,7 @@
           <a:p>
             <a:fld id="{D9DF0F1C-5577-4ACB-BB62-DF8F3C494C7E}" type="datetime1">
               <a:rPr lang="en-US" smtClean="0"/>
-              <a:t>4/3/2022</a:t>
+              <a:t>03-Apr-22</a:t>
             </a:fld>
             <a:endParaRPr lang="en-US" dirty="0"/>
           </a:p>
@@ -2059,7 +2415,7 @@
           <a:p>
             <a:fld id="{3A98EE3D-8CD1-4C3F-BD1C-C98C9596463C}" type="slidenum">
               <a:rPr lang="en-US" smtClean="0"/>
-              <a:t>‹#›</a:t>
+              <a:t>‹Nº›</a:t>
             </a:fld>
             <a:endParaRPr lang="en-US" dirty="0"/>
           </a:p>
@@ -2141,7 +2497,7 @@
           <a:p>
             <a:fld id="{1775B394-D9F9-4F0C-B15D-605F45CB9E9F}" type="datetime1">
               <a:rPr lang="en-US" smtClean="0"/>
-              <a:t>4/3/2022</a:t>
+              <a:t>03-Apr-22</a:t>
             </a:fld>
             <a:endParaRPr lang="en-US" dirty="0"/>
           </a:p>
@@ -2195,7 +2551,7 @@
           <a:p>
             <a:fld id="{3A98EE3D-8CD1-4C3F-BD1C-C98C9596463C}" type="slidenum">
               <a:rPr lang="en-US" smtClean="0"/>
-              <a:t>‹#›</a:t>
+              <a:t>‹Nº›</a:t>
             </a:fld>
             <a:endParaRPr lang="en-US" dirty="0"/>
           </a:p>
@@ -2298,7 +2654,7 @@
           <a:p>
             <a:fld id="{39667345-2558-425A-8533-9BFDBCE15005}" type="datetime1">
               <a:rPr lang="en-US" smtClean="0"/>
-              <a:t>4/3/2022</a:t>
+              <a:t>03-Apr-22</a:t>
             </a:fld>
             <a:endParaRPr lang="en-US" dirty="0"/>
           </a:p>
@@ -2352,7 +2708,7 @@
           <a:p>
             <a:fld id="{3A98EE3D-8CD1-4C3F-BD1C-C98C9596463C}" type="slidenum">
               <a:rPr lang="en-US" smtClean="0"/>
-              <a:t>‹#›</a:t>
+              <a:t>‹Nº›</a:t>
             </a:fld>
             <a:endParaRPr lang="en-US" dirty="0"/>
           </a:p>
@@ -2627,7 +2983,7 @@
           <a:p>
             <a:fld id="{92BEA474-078D-4E9B-9B14-09A87B19DC46}" type="datetime1">
               <a:rPr lang="en-US" smtClean="0"/>
-              <a:t>4/3/2022</a:t>
+              <a:t>03-Apr-22</a:t>
             </a:fld>
             <a:endParaRPr lang="en-US" dirty="0"/>
           </a:p>
@@ -2691,7 +3047,7 @@
             <a:fld id="{3A98EE3D-8CD1-4C3F-BD1C-C98C9596463C}" type="slidenum">
               <a:rPr lang="en-US" smtClean="0"/>
               <a:pPr/>
-              <a:t>‹#›</a:t>
+              <a:t>‹Nº›</a:t>
             </a:fld>
             <a:endParaRPr lang="en-US" dirty="0"/>
           </a:p>
@@ -2977,7 +3333,7 @@
           <a:p>
             <a:fld id="{4907D986-8816-4272-A432-0437A28A9828}" type="datetime1">
               <a:rPr lang="en-US" smtClean="0"/>
-              <a:t>4/3/2022</a:t>
+              <a:t>03-Apr-22</a:t>
             </a:fld>
             <a:endParaRPr lang="en-US" dirty="0"/>
           </a:p>
@@ -3025,7 +3381,7 @@
           <a:p>
             <a:fld id="{3A98EE3D-8CD1-4C3F-BD1C-C98C9596463C}" type="slidenum">
               <a:rPr lang="en-US" smtClean="0"/>
-              <a:t>‹#›</a:t>
+              <a:t>‹Nº›</a:t>
             </a:fld>
             <a:endParaRPr lang="en-US" dirty="0"/>
           </a:p>
@@ -3238,7 +3594,7 @@
           <a:p>
             <a:fld id="{62D6E202-B606-4609-B914-27C9371A1F6D}" type="datetime1">
               <a:rPr lang="en-US" smtClean="0"/>
-              <a:t>4/3/2022</a:t>
+              <a:t>03-Apr-22</a:t>
             </a:fld>
             <a:endParaRPr lang="en-US" dirty="0"/>
           </a:p>
@@ -3312,7 +3668,7 @@
           <a:p>
             <a:fld id="{3A98EE3D-8CD1-4C3F-BD1C-C98C9596463C}" type="slidenum">
               <a:rPr lang="en-US" smtClean="0"/>
-              <a:t>‹#›</a:t>
+              <a:t>‹Nº›</a:t>
             </a:fld>
             <a:endParaRPr lang="en-US" dirty="0"/>
           </a:p>
@@ -4304,6 +4660,66 @@
 </p:sld>
 </file>
 
+<file path=ppt/slides/slide10.xml><?xml version="1.0" encoding="utf-8"?>
+<p:sld xmlns:a="http://schemas.openxmlformats.org/drawingml/2006/main" xmlns:r="http://schemas.openxmlformats.org/officeDocument/2006/relationships" xmlns:p="http://schemas.openxmlformats.org/presentationml/2006/main">
+  <p:cSld>
+    <p:spTree>
+      <p:nvGrpSpPr>
+        <p:cNvPr id="1" name=""/>
+        <p:cNvGrpSpPr/>
+        <p:nvPr/>
+      </p:nvGrpSpPr>
+      <p:grpSpPr>
+        <a:xfrm>
+          <a:off x="0" y="0"/>
+          <a:ext cx="0" cy="0"/>
+          <a:chOff x="0" y="0"/>
+          <a:chExt cx="0" cy="0"/>
+        </a:xfrm>
+      </p:grpSpPr>
+      <p:pic>
+        <p:nvPicPr>
+          <p:cNvPr id="3" name="Imagen 2">
+            <a:extLst>
+              <a:ext uri="{FF2B5EF4-FFF2-40B4-BE49-F238E27FC236}">
+                <a16:creationId xmlns:a16="http://schemas.microsoft.com/office/drawing/2014/main" id="{F2F01EFA-BE82-47C7-B55C-86590C3851CF}"/>
+              </a:ext>
+            </a:extLst>
+          </p:cNvPr>
+          <p:cNvPicPr>
+            <a:picLocks noChangeAspect="1"/>
+          </p:cNvPicPr>
+          <p:nvPr/>
+        </p:nvPicPr>
+        <p:blipFill>
+          <a:blip r:embed="rId2"/>
+          <a:stretch>
+            <a:fillRect/>
+          </a:stretch>
+        </p:blipFill>
+        <p:spPr>
+          <a:xfrm>
+            <a:off x="468" y="0"/>
+            <a:ext cx="12191064" cy="6858000"/>
+          </a:xfrm>
+          <a:prstGeom prst="rect">
+            <a:avLst/>
+          </a:prstGeom>
+        </p:spPr>
+      </p:pic>
+    </p:spTree>
+    <p:extLst>
+      <p:ext uri="{BB962C8B-B14F-4D97-AF65-F5344CB8AC3E}">
+        <p14:creationId xmlns:p14="http://schemas.microsoft.com/office/powerpoint/2010/main" val="1087047496"/>
+      </p:ext>
+    </p:extLst>
+  </p:cSld>
+  <p:clrMapOvr>
+    <a:masterClrMapping/>
+  </p:clrMapOvr>
+</p:sld>
+</file>
+
 <file path=ppt/slides/slide2.xml><?xml version="1.0" encoding="utf-8"?>
 <p:sld xmlns:a="http://schemas.openxmlformats.org/drawingml/2006/main" xmlns:r="http://schemas.openxmlformats.org/officeDocument/2006/relationships" xmlns:p="http://schemas.openxmlformats.org/presentationml/2006/main">
   <p:cSld>
@@ -4344,7 +4760,7 @@
           <a:p>
             <a:r>
               <a:rPr lang="es-ES" dirty="0"/>
-              <a:t>Agenda</a:t>
+              <a:t>Alcance</a:t>
             </a:r>
             <a:endParaRPr lang="en-US" dirty="0"/>
           </a:p>
@@ -4371,7 +4787,22 @@
           <a:bodyPr/>
           <a:lstStyle/>
           <a:p>
-            <a:endParaRPr lang="en-US"/>
+            <a:r>
+              <a:rPr lang="es-ES" dirty="0"/>
+              <a:t>Desarrollar un comercio electrónico enfocado en ropa que permite a los usuarios visualizar y agregar productos a su lista de compra. También pueden crear una cuenta para realizar el proceso de pago de sus artículos. El proceso de pago comprende el ingreso de datos para el envío de los productos y la emisión del detalle de compra con su subtotal y </a:t>
+            </a:r>
+            <a:r>
+              <a:rPr lang="es-ES"/>
+              <a:t>total.</a:t>
+            </a:r>
+            <a:endParaRPr lang="es-ES" dirty="0"/>
+          </a:p>
+          <a:p>
+            <a:r>
+              <a:rPr lang="es-ES" dirty="0"/>
+              <a:t>El sistema permite a los administradores gestionar el inventario de productos y control total sobre las tablas de la base de datos.</a:t>
+            </a:r>
+            <a:endParaRPr lang="en-US" dirty="0"/>
           </a:p>
         </p:txBody>
       </p:sp>
@@ -4497,12 +4928,20 @@
           <a:lstStyle/>
           <a:p>
             <a:r>
-              <a:rPr lang="en-US" sz="4000">
+              <a:rPr lang="en-US" sz="4000" dirty="0" err="1">
                 <a:solidFill>
                   <a:srgbClr val="FFFFFF"/>
                 </a:solidFill>
               </a:rPr>
-              <a:t>Diagramas de Casos de Uso</a:t>
+              <a:t>Diagramas</a:t>
+            </a:r>
+            <a:r>
+              <a:rPr lang="en-US" sz="4000" dirty="0">
+                <a:solidFill>
+                  <a:srgbClr val="FFFFFF"/>
+                </a:solidFill>
+              </a:rPr>
+              <a:t> de Casos de Uso</a:t>
             </a:r>
           </a:p>
         </p:txBody>
@@ -5454,6 +5893,325 @@
     <p:extLst>
       <p:ext uri="{BB962C8B-B14F-4D97-AF65-F5344CB8AC3E}">
         <p14:creationId xmlns:p14="http://schemas.microsoft.com/office/powerpoint/2010/main" val="2070131326"/>
+      </p:ext>
+    </p:extLst>
+  </p:cSld>
+  <p:clrMapOvr>
+    <a:masterClrMapping/>
+  </p:clrMapOvr>
+</p:sld>
+</file>
+
+<file path=ppt/slides/slide8.xml><?xml version="1.0" encoding="utf-8"?>
+<p:sld xmlns:a="http://schemas.openxmlformats.org/drawingml/2006/main" xmlns:r="http://schemas.openxmlformats.org/officeDocument/2006/relationships" xmlns:p="http://schemas.openxmlformats.org/presentationml/2006/main">
+  <p:cSld>
+    <p:spTree>
+      <p:nvGrpSpPr>
+        <p:cNvPr id="1" name=""/>
+        <p:cNvGrpSpPr/>
+        <p:nvPr/>
+      </p:nvGrpSpPr>
+      <p:grpSpPr>
+        <a:xfrm>
+          <a:off x="0" y="0"/>
+          <a:ext cx="0" cy="0"/>
+          <a:chOff x="0" y="0"/>
+          <a:chExt cx="0" cy="0"/>
+        </a:xfrm>
+      </p:grpSpPr>
+      <p:pic>
+        <p:nvPicPr>
+          <p:cNvPr id="3" name="Imagen 2">
+            <a:extLst>
+              <a:ext uri="{FF2B5EF4-FFF2-40B4-BE49-F238E27FC236}">
+                <a16:creationId xmlns:a16="http://schemas.microsoft.com/office/drawing/2014/main" id="{C7B8DFC7-1278-4443-82E8-8AE68EB0BC4F}"/>
+              </a:ext>
+            </a:extLst>
+          </p:cNvPr>
+          <p:cNvPicPr>
+            <a:picLocks noChangeAspect="1"/>
+          </p:cNvPicPr>
+          <p:nvPr/>
+        </p:nvPicPr>
+        <p:blipFill>
+          <a:blip r:embed="rId2"/>
+          <a:stretch>
+            <a:fillRect/>
+          </a:stretch>
+        </p:blipFill>
+        <p:spPr>
+          <a:xfrm>
+            <a:off x="5400046" y="0"/>
+            <a:ext cx="6493230" cy="4089710"/>
+          </a:xfrm>
+          <a:prstGeom prst="rect">
+            <a:avLst/>
+          </a:prstGeom>
+        </p:spPr>
+      </p:pic>
+      <p:pic>
+        <p:nvPicPr>
+          <p:cNvPr id="5" name="Imagen 4">
+            <a:extLst>
+              <a:ext uri="{FF2B5EF4-FFF2-40B4-BE49-F238E27FC236}">
+                <a16:creationId xmlns:a16="http://schemas.microsoft.com/office/drawing/2014/main" id="{8B14D4F5-B39D-49C4-9B32-52426C82C0A5}"/>
+              </a:ext>
+            </a:extLst>
+          </p:cNvPr>
+          <p:cNvPicPr>
+            <a:picLocks noChangeAspect="1"/>
+          </p:cNvPicPr>
+          <p:nvPr/>
+        </p:nvPicPr>
+        <p:blipFill>
+          <a:blip r:embed="rId3"/>
+          <a:stretch>
+            <a:fillRect/>
+          </a:stretch>
+        </p:blipFill>
+        <p:spPr>
+          <a:xfrm>
+            <a:off x="180346" y="4378261"/>
+            <a:ext cx="6572880" cy="1844289"/>
+          </a:xfrm>
+          <a:prstGeom prst="rect">
+            <a:avLst/>
+          </a:prstGeom>
+        </p:spPr>
+      </p:pic>
+      <p:sp>
+        <p:nvSpPr>
+          <p:cNvPr id="7" name="Title 1">
+            <a:extLst>
+              <a:ext uri="{FF2B5EF4-FFF2-40B4-BE49-F238E27FC236}">
+                <a16:creationId xmlns:a16="http://schemas.microsoft.com/office/drawing/2014/main" id="{3CFDC2D4-241B-4D15-A638-78C6CA3DF595}"/>
+              </a:ext>
+            </a:extLst>
+          </p:cNvPr>
+          <p:cNvSpPr txBox="1">
+            <a:spLocks/>
+          </p:cNvSpPr>
+          <p:nvPr/>
+        </p:nvSpPr>
+        <p:spPr>
+          <a:xfrm>
+            <a:off x="298724" y="316810"/>
+            <a:ext cx="4852458" cy="2731190"/>
+          </a:xfrm>
+          <a:prstGeom prst="rect">
+            <a:avLst/>
+          </a:prstGeom>
+        </p:spPr>
+        <p:txBody>
+          <a:bodyPr vert="horz" lIns="91440" tIns="45720" rIns="91440" bIns="45720" rtlCol="0" anchor="b">
+            <a:noAutofit/>
+          </a:bodyPr>
+          <a:lstStyle>
+            <a:lvl1pPr algn="l" defTabSz="914400" rtl="0" eaLnBrk="1" latinLnBrk="0" hangingPunct="1">
+              <a:lnSpc>
+                <a:spcPct val="90000"/>
+              </a:lnSpc>
+              <a:spcBef>
+                <a:spcPct val="0"/>
+              </a:spcBef>
+              <a:buNone/>
+              <a:defRPr sz="4200" i="0" kern="1200" spc="-50" baseline="0">
+                <a:solidFill>
+                  <a:schemeClr val="tx1">
+                    <a:lumMod val="75000"/>
+                    <a:lumOff val="25000"/>
+                  </a:schemeClr>
+                </a:solidFill>
+                <a:latin typeface="+mj-lt"/>
+                <a:ea typeface="+mj-ea"/>
+                <a:cs typeface="+mj-cs"/>
+              </a:defRPr>
+            </a:lvl1pPr>
+          </a:lstStyle>
+          <a:p>
+            <a:r>
+              <a:rPr lang="en-US" sz="5400" dirty="0">
+                <a:solidFill>
+                  <a:schemeClr val="tx1"/>
+                </a:solidFill>
+              </a:rPr>
+              <a:t>Vistas de </a:t>
+            </a:r>
+            <a:r>
+              <a:rPr lang="en-US" sz="5400" dirty="0" err="1">
+                <a:solidFill>
+                  <a:schemeClr val="tx1"/>
+                </a:solidFill>
+              </a:rPr>
+              <a:t>métodos</a:t>
+            </a:r>
+            <a:r>
+              <a:rPr lang="en-US" sz="5400" dirty="0">
+                <a:solidFill>
+                  <a:schemeClr val="tx1"/>
+                </a:solidFill>
+              </a:rPr>
+              <a:t> CRUD</a:t>
+            </a:r>
+          </a:p>
+        </p:txBody>
+      </p:sp>
+    </p:spTree>
+    <p:extLst>
+      <p:ext uri="{BB962C8B-B14F-4D97-AF65-F5344CB8AC3E}">
+        <p14:creationId xmlns:p14="http://schemas.microsoft.com/office/powerpoint/2010/main" val="998630119"/>
+      </p:ext>
+    </p:extLst>
+  </p:cSld>
+  <p:clrMapOvr>
+    <a:masterClrMapping/>
+  </p:clrMapOvr>
+  <p:timing>
+    <p:tnLst>
+      <p:par>
+        <p:cTn id="1" dur="indefinite" restart="never" nodeType="tmRoot">
+          <p:childTnLst>
+            <p:seq concurrent="1" nextAc="seek">
+              <p:cTn id="2" dur="indefinite" nodeType="mainSeq">
+                <p:childTnLst>
+                  <p:par>
+                    <p:cTn id="3" fill="hold">
+                      <p:stCondLst>
+                        <p:cond delay="indefinite"/>
+                        <p:cond evt="onBegin" delay="0">
+                          <p:tn val="2"/>
+                        </p:cond>
+                      </p:stCondLst>
+                      <p:childTnLst>
+                        <p:par>
+                          <p:cTn id="4" fill="hold">
+                            <p:stCondLst>
+                              <p:cond delay="0"/>
+                            </p:stCondLst>
+                            <p:childTnLst>
+                              <p:par>
+                                <p:cTn id="5" presetID="10" presetClass="entr" presetSubtype="0" fill="hold" grpId="0" nodeType="withEffect">
+                                  <p:stCondLst>
+                                    <p:cond delay="1000"/>
+                                  </p:stCondLst>
+                                  <p:iterate>
+                                    <p:tmPct val="10000"/>
+                                  </p:iterate>
+                                  <p:childTnLst>
+                                    <p:set>
+                                      <p:cBhvr>
+                                        <p:cTn id="6" dur="1" fill="hold">
+                                          <p:stCondLst>
+                                            <p:cond delay="0"/>
+                                          </p:stCondLst>
+                                        </p:cTn>
+                                        <p:tgtEl>
+                                          <p:spTgt spid="7"/>
+                                        </p:tgtEl>
+                                        <p:attrNameLst>
+                                          <p:attrName>style.visibility</p:attrName>
+                                        </p:attrNameLst>
+                                      </p:cBhvr>
+                                      <p:to>
+                                        <p:strVal val="visible"/>
+                                      </p:to>
+                                    </p:set>
+                                    <p:animEffect transition="in" filter="fade">
+                                      <p:cBhvr>
+                                        <p:cTn id="7" dur="700"/>
+                                        <p:tgtEl>
+                                          <p:spTgt spid="7"/>
+                                        </p:tgtEl>
+                                      </p:cBhvr>
+                                    </p:animEffect>
+                                  </p:childTnLst>
+                                </p:cTn>
+                              </p:par>
+                            </p:childTnLst>
+                          </p:cTn>
+                        </p:par>
+                      </p:childTnLst>
+                    </p:cTn>
+                  </p:par>
+                </p:childTnLst>
+              </p:cTn>
+              <p:prevCondLst>
+                <p:cond evt="onPrev" delay="0">
+                  <p:tgtEl>
+                    <p:sldTgt/>
+                  </p:tgtEl>
+                </p:cond>
+              </p:prevCondLst>
+              <p:nextCondLst>
+                <p:cond evt="onNext" delay="0">
+                  <p:tgtEl>
+                    <p:sldTgt/>
+                  </p:tgtEl>
+                </p:cond>
+              </p:nextCondLst>
+            </p:seq>
+          </p:childTnLst>
+        </p:cTn>
+      </p:par>
+    </p:tnLst>
+    <p:bldLst>
+      <p:bldP spid="7" grpId="0"/>
+    </p:bldLst>
+  </p:timing>
+</p:sld>
+</file>
+
+<file path=ppt/slides/slide9.xml><?xml version="1.0" encoding="utf-8"?>
+<p:sld xmlns:a="http://schemas.openxmlformats.org/drawingml/2006/main" xmlns:r="http://schemas.openxmlformats.org/officeDocument/2006/relationships" xmlns:p="http://schemas.openxmlformats.org/presentationml/2006/main">
+  <p:cSld>
+    <p:spTree>
+      <p:nvGrpSpPr>
+        <p:cNvPr id="1" name=""/>
+        <p:cNvGrpSpPr/>
+        <p:nvPr/>
+      </p:nvGrpSpPr>
+      <p:grpSpPr>
+        <a:xfrm>
+          <a:off x="0" y="0"/>
+          <a:ext cx="0" cy="0"/>
+          <a:chOff x="0" y="0"/>
+          <a:chExt cx="0" cy="0"/>
+        </a:xfrm>
+      </p:grpSpPr>
+      <p:pic>
+        <p:nvPicPr>
+          <p:cNvPr id="3" name="Imagen 2">
+            <a:extLst>
+              <a:ext uri="{FF2B5EF4-FFF2-40B4-BE49-F238E27FC236}">
+                <a16:creationId xmlns:a16="http://schemas.microsoft.com/office/drawing/2014/main" id="{85E712D8-562E-469C-8DDC-3AAF7251443D}"/>
+              </a:ext>
+            </a:extLst>
+          </p:cNvPr>
+          <p:cNvPicPr>
+            <a:picLocks noChangeAspect="1"/>
+          </p:cNvPicPr>
+          <p:nvPr/>
+        </p:nvPicPr>
+        <p:blipFill>
+          <a:blip r:embed="rId2"/>
+          <a:stretch>
+            <a:fillRect/>
+          </a:stretch>
+        </p:blipFill>
+        <p:spPr>
+          <a:xfrm>
+            <a:off x="0" y="297055"/>
+            <a:ext cx="12192000" cy="6035290"/>
+          </a:xfrm>
+          <a:prstGeom prst="rect">
+            <a:avLst/>
+          </a:prstGeom>
+        </p:spPr>
+      </p:pic>
+    </p:spTree>
+    <p:extLst>
+      <p:ext uri="{BB962C8B-B14F-4D97-AF65-F5344CB8AC3E}">
+        <p14:creationId xmlns:p14="http://schemas.microsoft.com/office/powerpoint/2010/main" val="2884869888"/>
       </p:ext>
     </p:extLst>
   </p:cSld>
@@ -5744,4 +6502,299 @@
     </a:ext>
   </a:extLst>
 </a:theme>
+</file>
+
+<file path=ppt/theme/theme2.xml><?xml version="1.0" encoding="utf-8"?>
+<a:theme xmlns:a="http://schemas.openxmlformats.org/drawingml/2006/main" name="Tema de Office">
+  <a:themeElements>
+    <a:clrScheme name="Office">
+      <a:dk1>
+        <a:sysClr val="windowText" lastClr="000000"/>
+      </a:dk1>
+      <a:lt1>
+        <a:sysClr val="window" lastClr="FFFFFF"/>
+      </a:lt1>
+      <a:dk2>
+        <a:srgbClr val="44546A"/>
+      </a:dk2>
+      <a:lt2>
+        <a:srgbClr val="E7E6E6"/>
+      </a:lt2>
+      <a:accent1>
+        <a:srgbClr val="4472C4"/>
+      </a:accent1>
+      <a:accent2>
+        <a:srgbClr val="ED7D31"/>
+      </a:accent2>
+      <a:accent3>
+        <a:srgbClr val="A5A5A5"/>
+      </a:accent3>
+      <a:accent4>
+        <a:srgbClr val="FFC000"/>
+      </a:accent4>
+      <a:accent5>
+        <a:srgbClr val="5B9BD5"/>
+      </a:accent5>
+      <a:accent6>
+        <a:srgbClr val="70AD47"/>
+      </a:accent6>
+      <a:hlink>
+        <a:srgbClr val="0563C1"/>
+      </a:hlink>
+      <a:folHlink>
+        <a:srgbClr val="954F72"/>
+      </a:folHlink>
+    </a:clrScheme>
+    <a:fontScheme name="Office">
+      <a:majorFont>
+        <a:latin typeface="Calibri Light" panose="020F0302020204030204"/>
+        <a:ea typeface=""/>
+        <a:cs typeface=""/>
+        <a:font script="Jpan" typeface="游ゴシック Light"/>
+        <a:font script="Hang" typeface="맑은 고딕"/>
+        <a:font script="Hans" typeface="等线 Light"/>
+        <a:font script="Hant" typeface="新細明體"/>
+        <a:font script="Arab" typeface="Times New Roman"/>
+        <a:font script="Hebr" typeface="Times New Roman"/>
+        <a:font script="Thai" typeface="Angsana New"/>
+        <a:font script="Ethi" typeface="Nyala"/>
+        <a:font script="Beng" typeface="Vrinda"/>
+        <a:font script="Gujr" typeface="Shruti"/>
+        <a:font script="Khmr" typeface="MoolBoran"/>
+        <a:font script="Knda" typeface="Tunga"/>
+        <a:font script="Guru" typeface="Raavi"/>
+        <a:font script="Cans" typeface="Euphemia"/>
+        <a:font script="Cher" typeface="Plantagenet Cherokee"/>
+        <a:font script="Yiii" typeface="Microsoft Yi Baiti"/>
+        <a:font script="Tibt" typeface="Microsoft Himalaya"/>
+        <a:font script="Thaa" typeface="MV Boli"/>
+        <a:font script="Deva" typeface="Mangal"/>
+        <a:font script="Telu" typeface="Gautami"/>
+        <a:font script="Taml" typeface="Latha"/>
+        <a:font script="Syrc" typeface="Estrangelo Edessa"/>
+        <a:font script="Orya" typeface="Kalinga"/>
+        <a:font script="Mlym" typeface="Kartika"/>
+        <a:font script="Laoo" typeface="DokChampa"/>
+        <a:font script="Sinh" typeface="Iskoola Pota"/>
+        <a:font script="Mong" typeface="Mongolian Baiti"/>
+        <a:font script="Viet" typeface="Times New Roman"/>
+        <a:font script="Uigh" typeface="Microsoft Uighur"/>
+        <a:font script="Geor" typeface="Sylfaen"/>
+        <a:font script="Armn" typeface="Arial"/>
+        <a:font script="Bugi" typeface="Leelawadee UI"/>
+        <a:font script="Bopo" typeface="Microsoft JhengHei"/>
+        <a:font script="Java" typeface="Javanese Text"/>
+        <a:font script="Lisu" typeface="Segoe UI"/>
+        <a:font script="Mymr" typeface="Myanmar Text"/>
+        <a:font script="Nkoo" typeface="Ebrima"/>
+        <a:font script="Olck" typeface="Nirmala UI"/>
+        <a:font script="Osma" typeface="Ebrima"/>
+        <a:font script="Phag" typeface="Phagspa"/>
+        <a:font script="Syrn" typeface="Estrangelo Edessa"/>
+        <a:font script="Syrj" typeface="Estrangelo Edessa"/>
+        <a:font script="Syre" typeface="Estrangelo Edessa"/>
+        <a:font script="Sora" typeface="Nirmala UI"/>
+        <a:font script="Tale" typeface="Microsoft Tai Le"/>
+        <a:font script="Talu" typeface="Microsoft New Tai Lue"/>
+        <a:font script="Tfng" typeface="Ebrima"/>
+      </a:majorFont>
+      <a:minorFont>
+        <a:latin typeface="Calibri" panose="020F0502020204030204"/>
+        <a:ea typeface=""/>
+        <a:cs typeface=""/>
+        <a:font script="Jpan" typeface="游ゴシック"/>
+        <a:font script="Hang" typeface="맑은 고딕"/>
+        <a:font script="Hans" typeface="等线"/>
+        <a:font script="Hant" typeface="新細明體"/>
+        <a:font script="Arab" typeface="Arial"/>
+        <a:font script="Hebr" typeface="Arial"/>
+        <a:font script="Thai" typeface="Cordia New"/>
+        <a:font script="Ethi" typeface="Nyala"/>
+        <a:font script="Beng" typeface="Vrinda"/>
+        <a:font script="Gujr" typeface="Shruti"/>
+        <a:font script="Khmr" typeface="DaunPenh"/>
+        <a:font script="Knda" typeface="Tunga"/>
+        <a:font script="Guru" typeface="Raavi"/>
+        <a:font script="Cans" typeface="Euphemia"/>
+        <a:font script="Cher" typeface="Plantagenet Cherokee"/>
+        <a:font script="Yiii" typeface="Microsoft Yi Baiti"/>
+        <a:font script="Tibt" typeface="Microsoft Himalaya"/>
+        <a:font script="Thaa" typeface="MV Boli"/>
+        <a:font script="Deva" typeface="Mangal"/>
+        <a:font script="Telu" typeface="Gautami"/>
+        <a:font script="Taml" typeface="Latha"/>
+        <a:font script="Syrc" typeface="Estrangelo Edessa"/>
+        <a:font script="Orya" typeface="Kalinga"/>
+        <a:font script="Mlym" typeface="Kartika"/>
+        <a:font script="Laoo" typeface="DokChampa"/>
+        <a:font script="Sinh" typeface="Iskoola Pota"/>
+        <a:font script="Mong" typeface="Mongolian Baiti"/>
+        <a:font script="Viet" typeface="Arial"/>
+        <a:font script="Uigh" typeface="Microsoft Uighur"/>
+        <a:font script="Geor" typeface="Sylfaen"/>
+        <a:font script="Armn" typeface="Arial"/>
+        <a:font script="Bugi" typeface="Leelawadee UI"/>
+        <a:font script="Bopo" typeface="Microsoft JhengHei"/>
+        <a:font script="Java" typeface="Javanese Text"/>
+        <a:font script="Lisu" typeface="Segoe UI"/>
+        <a:font script="Mymr" typeface="Myanmar Text"/>
+        <a:font script="Nkoo" typeface="Ebrima"/>
+        <a:font script="Olck" typeface="Nirmala UI"/>
+        <a:font script="Osma" typeface="Ebrima"/>
+        <a:font script="Phag" typeface="Phagspa"/>
+        <a:font script="Syrn" typeface="Estrangelo Edessa"/>
+        <a:font script="Syrj" typeface="Estrangelo Edessa"/>
+        <a:font script="Syre" typeface="Estrangelo Edessa"/>
+        <a:font script="Sora" typeface="Nirmala UI"/>
+        <a:font script="Tale" typeface="Microsoft Tai Le"/>
+        <a:font script="Talu" typeface="Microsoft New Tai Lue"/>
+        <a:font script="Tfng" typeface="Ebrima"/>
+      </a:minorFont>
+    </a:fontScheme>
+    <a:fmtScheme name="Office">
+      <a:fillStyleLst>
+        <a:solidFill>
+          <a:schemeClr val="phClr"/>
+        </a:solidFill>
+        <a:gradFill rotWithShape="1">
+          <a:gsLst>
+            <a:gs pos="0">
+              <a:schemeClr val="phClr">
+                <a:lumMod val="110000"/>
+                <a:satMod val="105000"/>
+                <a:tint val="67000"/>
+              </a:schemeClr>
+            </a:gs>
+            <a:gs pos="50000">
+              <a:schemeClr val="phClr">
+                <a:lumMod val="105000"/>
+                <a:satMod val="103000"/>
+                <a:tint val="73000"/>
+              </a:schemeClr>
+            </a:gs>
+            <a:gs pos="100000">
+              <a:schemeClr val="phClr">
+                <a:lumMod val="105000"/>
+                <a:satMod val="109000"/>
+                <a:tint val="81000"/>
+              </a:schemeClr>
+            </a:gs>
+          </a:gsLst>
+          <a:lin ang="5400000" scaled="0"/>
+        </a:gradFill>
+        <a:gradFill rotWithShape="1">
+          <a:gsLst>
+            <a:gs pos="0">
+              <a:schemeClr val="phClr">
+                <a:satMod val="103000"/>
+                <a:lumMod val="102000"/>
+                <a:tint val="94000"/>
+              </a:schemeClr>
+            </a:gs>
+            <a:gs pos="50000">
+              <a:schemeClr val="phClr">
+                <a:satMod val="110000"/>
+                <a:lumMod val="100000"/>
+                <a:shade val="100000"/>
+              </a:schemeClr>
+            </a:gs>
+            <a:gs pos="100000">
+              <a:schemeClr val="phClr">
+                <a:lumMod val="99000"/>
+                <a:satMod val="120000"/>
+                <a:shade val="78000"/>
+              </a:schemeClr>
+            </a:gs>
+          </a:gsLst>
+          <a:lin ang="5400000" scaled="0"/>
+        </a:gradFill>
+      </a:fillStyleLst>
+      <a:lnStyleLst>
+        <a:ln w="6350" cap="flat" cmpd="sng" algn="ctr">
+          <a:solidFill>
+            <a:schemeClr val="phClr"/>
+          </a:solidFill>
+          <a:prstDash val="solid"/>
+          <a:miter lim="800000"/>
+        </a:ln>
+        <a:ln w="12700" cap="flat" cmpd="sng" algn="ctr">
+          <a:solidFill>
+            <a:schemeClr val="phClr"/>
+          </a:solidFill>
+          <a:prstDash val="solid"/>
+          <a:miter lim="800000"/>
+        </a:ln>
+        <a:ln w="19050" cap="flat" cmpd="sng" algn="ctr">
+          <a:solidFill>
+            <a:schemeClr val="phClr"/>
+          </a:solidFill>
+          <a:prstDash val="solid"/>
+          <a:miter lim="800000"/>
+        </a:ln>
+      </a:lnStyleLst>
+      <a:effectStyleLst>
+        <a:effectStyle>
+          <a:effectLst/>
+        </a:effectStyle>
+        <a:effectStyle>
+          <a:effectLst/>
+        </a:effectStyle>
+        <a:effectStyle>
+          <a:effectLst>
+            <a:outerShdw blurRad="57150" dist="19050" dir="5400000" algn="ctr" rotWithShape="0">
+              <a:srgbClr val="000000">
+                <a:alpha val="63000"/>
+              </a:srgbClr>
+            </a:outerShdw>
+          </a:effectLst>
+        </a:effectStyle>
+      </a:effectStyleLst>
+      <a:bgFillStyleLst>
+        <a:solidFill>
+          <a:schemeClr val="phClr"/>
+        </a:solidFill>
+        <a:solidFill>
+          <a:schemeClr val="phClr">
+            <a:tint val="95000"/>
+            <a:satMod val="170000"/>
+          </a:schemeClr>
+        </a:solidFill>
+        <a:gradFill rotWithShape="1">
+          <a:gsLst>
+            <a:gs pos="0">
+              <a:schemeClr val="phClr">
+                <a:tint val="93000"/>
+                <a:satMod val="150000"/>
+                <a:shade val="98000"/>
+                <a:lumMod val="102000"/>
+              </a:schemeClr>
+            </a:gs>
+            <a:gs pos="50000">
+              <a:schemeClr val="phClr">
+                <a:tint val="98000"/>
+                <a:satMod val="130000"/>
+                <a:shade val="90000"/>
+                <a:lumMod val="103000"/>
+              </a:schemeClr>
+            </a:gs>
+            <a:gs pos="100000">
+              <a:schemeClr val="phClr">
+                <a:shade val="63000"/>
+                <a:satMod val="120000"/>
+              </a:schemeClr>
+            </a:gs>
+          </a:gsLst>
+          <a:lin ang="5400000" scaled="0"/>
+        </a:gradFill>
+      </a:bgFillStyleLst>
+    </a:fmtScheme>
+  </a:themeElements>
+  <a:objectDefaults/>
+  <a:extraClrSchemeLst/>
+  <a:extLst>
+    <a:ext uri="{05A4C25C-085E-4340-85A3-A5531E510DB2}">
+      <thm15:themeFamily xmlns:thm15="http://schemas.microsoft.com/office/thememl/2012/main" name="Office Theme" id="{62F939B6-93AF-4DB8-9C6B-D6C7DFDC589F}" vid="{4A3C46E8-61CC-4603-A589-7422A47A8E4A}"/>
+    </a:ext>
+  </a:extLst>
+</a:theme>
 </file>
</xml_diff>

<commit_message>
Actualizar modelos de la base de datos
</commit_message>
<xml_diff>
--- a/Documentos aula virtual/Grupo 2 - Semana 2.pptx
+++ b/Documentos aula virtual/Grupo 2 - Semana 2.pptx
@@ -5,7 +5,7 @@
     <p:sldMasterId id="2147483673" r:id="rId1"/>
   </p:sldMasterIdLst>
   <p:notesMasterIdLst>
-    <p:notesMasterId r:id="rId17"/>
+    <p:notesMasterId r:id="rId20"/>
   </p:notesMasterIdLst>
   <p:sldIdLst>
     <p:sldId id="256" r:id="rId2"/>
@@ -15,14 +15,17 @@
     <p:sldId id="260" r:id="rId6"/>
     <p:sldId id="261" r:id="rId7"/>
     <p:sldId id="262" r:id="rId8"/>
-    <p:sldId id="266" r:id="rId9"/>
-    <p:sldId id="267" r:id="rId10"/>
-    <p:sldId id="268" r:id="rId11"/>
-    <p:sldId id="269" r:id="rId12"/>
-    <p:sldId id="270" r:id="rId13"/>
-    <p:sldId id="263" r:id="rId14"/>
-    <p:sldId id="264" r:id="rId15"/>
-    <p:sldId id="265" r:id="rId16"/>
+    <p:sldId id="271" r:id="rId9"/>
+    <p:sldId id="272" r:id="rId10"/>
+    <p:sldId id="273" r:id="rId11"/>
+    <p:sldId id="266" r:id="rId12"/>
+    <p:sldId id="267" r:id="rId13"/>
+    <p:sldId id="268" r:id="rId14"/>
+    <p:sldId id="269" r:id="rId15"/>
+    <p:sldId id="270" r:id="rId16"/>
+    <p:sldId id="263" r:id="rId17"/>
+    <p:sldId id="264" r:id="rId18"/>
+    <p:sldId id="265" r:id="rId19"/>
   </p:sldIdLst>
   <p:sldSz cx="12192000" cy="6858000"/>
   <p:notesSz cx="6858000" cy="9144000"/>
@@ -211,7 +214,7 @@
           <a:p>
             <a:fld id="{A265FD30-954D-4D65-9CD6-C4FFED460B38}" type="datetimeFigureOut">
               <a:rPr lang="es-419" smtClean="0"/>
-              <a:t>3/4/2022</a:t>
+              <a:t>8/4/2022</a:t>
             </a:fld>
             <a:endParaRPr lang="es-419"/>
           </a:p>
@@ -723,7 +726,7 @@
           <a:p>
             <a:fld id="{9184DA70-C731-4C70-880D-CCD4705E623C}" type="datetime1">
               <a:rPr lang="en-US" smtClean="0"/>
-              <a:t>4/3/2022</a:t>
+              <a:t>08-Apr-22</a:t>
             </a:fld>
             <a:endParaRPr lang="en-US" dirty="0"/>
           </a:p>
@@ -911,7 +914,7 @@
           <a:p>
             <a:fld id="{B612A279-0833-481D-8C56-F67FD0AC6C50}" type="datetime1">
               <a:rPr lang="en-US" smtClean="0"/>
-              <a:t>4/3/2022</a:t>
+              <a:t>08-Apr-22</a:t>
             </a:fld>
             <a:endParaRPr lang="en-US" dirty="0"/>
           </a:p>
@@ -1153,7 +1156,7 @@
           <a:p>
             <a:fld id="{6587DA83-5663-4C9C-B9AA-0B40A3DAFF81}" type="datetime1">
               <a:rPr lang="en-US" smtClean="0"/>
-              <a:t>4/3/2022</a:t>
+              <a:t>08-Apr-22</a:t>
             </a:fld>
             <a:endParaRPr lang="en-US" dirty="0"/>
           </a:p>
@@ -1341,7 +1344,7 @@
           <a:p>
             <a:fld id="{4BE1D723-8F53-4F53-90B0-1982A396982E}" type="datetime1">
               <a:rPr lang="en-US" smtClean="0"/>
-              <a:t>4/3/2022</a:t>
+              <a:t>08-Apr-22</a:t>
             </a:fld>
             <a:endParaRPr lang="en-US" dirty="0"/>
           </a:p>
@@ -1714,7 +1717,7 @@
           <a:p>
             <a:fld id="{97669AF7-7BEB-44E4-9852-375E34362B5B}" type="datetime1">
               <a:rPr lang="en-US" smtClean="0"/>
-              <a:t>4/3/2022</a:t>
+              <a:t>08-Apr-22</a:t>
             </a:fld>
             <a:endParaRPr lang="en-US" dirty="0"/>
           </a:p>
@@ -1969,7 +1972,7 @@
           <a:p>
             <a:fld id="{BAAAC38D-0552-4C82-B593-E6124DFADBE2}" type="datetime1">
               <a:rPr lang="en-US" smtClean="0"/>
-              <a:t>4/3/2022</a:t>
+              <a:t>08-Apr-22</a:t>
             </a:fld>
             <a:endParaRPr lang="en-US" dirty="0"/>
           </a:p>
@@ -2366,7 +2369,7 @@
           <a:p>
             <a:fld id="{D9DF0F1C-5577-4ACB-BB62-DF8F3C494C7E}" type="datetime1">
               <a:rPr lang="en-US" smtClean="0"/>
-              <a:t>4/3/2022</a:t>
+              <a:t>08-Apr-22</a:t>
             </a:fld>
             <a:endParaRPr lang="en-US" dirty="0"/>
           </a:p>
@@ -2502,7 +2505,7 @@
           <a:p>
             <a:fld id="{1775B394-D9F9-4F0C-B15D-605F45CB9E9F}" type="datetime1">
               <a:rPr lang="en-US" smtClean="0"/>
-              <a:t>4/3/2022</a:t>
+              <a:t>08-Apr-22</a:t>
             </a:fld>
             <a:endParaRPr lang="en-US" dirty="0"/>
           </a:p>
@@ -2659,7 +2662,7 @@
           <a:p>
             <a:fld id="{39667345-2558-425A-8533-9BFDBCE15005}" type="datetime1">
               <a:rPr lang="en-US" smtClean="0"/>
-              <a:t>4/3/2022</a:t>
+              <a:t>08-Apr-22</a:t>
             </a:fld>
             <a:endParaRPr lang="en-US" dirty="0"/>
           </a:p>
@@ -2988,7 +2991,7 @@
           <a:p>
             <a:fld id="{92BEA474-078D-4E9B-9B14-09A87B19DC46}" type="datetime1">
               <a:rPr lang="en-US" smtClean="0"/>
-              <a:t>4/3/2022</a:t>
+              <a:t>08-Apr-22</a:t>
             </a:fld>
             <a:endParaRPr lang="en-US" dirty="0"/>
           </a:p>
@@ -3338,7 +3341,7 @@
           <a:p>
             <a:fld id="{4907D986-8816-4272-A432-0437A28A9828}" type="datetime1">
               <a:rPr lang="en-US" smtClean="0"/>
-              <a:t>4/3/2022</a:t>
+              <a:t>08-Apr-22</a:t>
             </a:fld>
             <a:endParaRPr lang="en-US" dirty="0"/>
           </a:p>
@@ -3599,7 +3602,7 @@
           <a:p>
             <a:fld id="{62D6E202-B606-4609-B914-27C9371A1F6D}" type="datetime1">
               <a:rPr lang="en-US" smtClean="0"/>
-              <a:t>4/3/2022</a:t>
+              <a:t>08-Apr-22</a:t>
             </a:fld>
             <a:endParaRPr lang="en-US" dirty="0"/>
           </a:p>
@@ -4684,28 +4687,55 @@
       </p:grpSpPr>
       <p:sp>
         <p:nvSpPr>
-          <p:cNvPr id="2" name="Título 1">
-            <a:extLst>
-              <a:ext uri="{FF2B5EF4-FFF2-40B4-BE49-F238E27FC236}">
-                <a16:creationId xmlns:a16="http://schemas.microsoft.com/office/drawing/2014/main" id="{A43BFA35-14AD-4AEC-A65A-30BCEDAD337D}"/>
-              </a:ext>
-            </a:extLst>
-          </p:cNvPr>
-          <p:cNvSpPr>
-            <a:spLocks noGrp="1"/>
-          </p:cNvSpPr>
-          <p:nvPr>
-            <p:ph type="title"/>
-          </p:nvPr>
-        </p:nvSpPr>
-        <p:spPr/>
+          <p:cNvPr id="2" name="Title 1">
+            <a:extLst>
+              <a:ext uri="{FF2B5EF4-FFF2-40B4-BE49-F238E27FC236}">
+                <a16:creationId xmlns:a16="http://schemas.microsoft.com/office/drawing/2014/main" id="{A370127A-86F6-4844-8BEC-2AD4935A3D03}"/>
+              </a:ext>
+            </a:extLst>
+          </p:cNvPr>
+          <p:cNvSpPr txBox="1">
+            <a:spLocks/>
+          </p:cNvSpPr>
+          <p:nvPr/>
+        </p:nvSpPr>
+        <p:spPr>
+          <a:xfrm>
+            <a:off x="225743" y="215166"/>
+            <a:ext cx="10058400" cy="570647"/>
+          </a:xfrm>
+          <a:prstGeom prst="rect">
+            <a:avLst/>
+          </a:prstGeom>
+        </p:spPr>
         <p:txBody>
           <a:bodyPr/>
-          <a:lstStyle/>
-          <a:p>
-            <a:r>
-              <a:rPr lang="es-EC" dirty="0"/>
-              <a:t>Tabla Factura</a:t>
+          <a:lstStyle>
+            <a:lvl1pPr algn="l" defTabSz="914400" rtl="0" eaLnBrk="1" latinLnBrk="0" hangingPunct="1">
+              <a:lnSpc>
+                <a:spcPct val="90000"/>
+              </a:lnSpc>
+              <a:spcBef>
+                <a:spcPct val="0"/>
+              </a:spcBef>
+              <a:buNone/>
+              <a:defRPr sz="4200" i="0" kern="1200" spc="-50" baseline="0">
+                <a:solidFill>
+                  <a:schemeClr val="tx1">
+                    <a:lumMod val="75000"/>
+                    <a:lumOff val="25000"/>
+                  </a:schemeClr>
+                </a:solidFill>
+                <a:latin typeface="+mj-lt"/>
+                <a:ea typeface="+mj-ea"/>
+                <a:cs typeface="+mj-cs"/>
+              </a:defRPr>
+            </a:lvl1pPr>
+          </a:lstStyle>
+          <a:p>
+            <a:r>
+              <a:rPr lang="es-ES" dirty="0"/>
+              <a:t>Modelo físico de la base de datos</a:t>
             </a:r>
             <a:endParaRPr lang="en-US" dirty="0"/>
           </a:p>
@@ -4713,19 +4743,17 @@
       </p:sp>
       <p:pic>
         <p:nvPicPr>
-          <p:cNvPr id="5" name="Marcador de contenido 4">
-            <a:extLst>
-              <a:ext uri="{FF2B5EF4-FFF2-40B4-BE49-F238E27FC236}">
-                <a16:creationId xmlns:a16="http://schemas.microsoft.com/office/drawing/2014/main" id="{685A1BAB-DC8F-4289-80D0-EAA1EFAC31C2}"/>
+          <p:cNvPr id="4" name="Imagen 3">
+            <a:extLst>
+              <a:ext uri="{FF2B5EF4-FFF2-40B4-BE49-F238E27FC236}">
+                <a16:creationId xmlns:a16="http://schemas.microsoft.com/office/drawing/2014/main" id="{6075BF47-C659-420B-9E0E-85C16947D78A}"/>
               </a:ext>
             </a:extLst>
           </p:cNvPr>
           <p:cNvPicPr>
-            <a:picLocks noGrp="1" noChangeAspect="1"/>
+            <a:picLocks noChangeAspect="1"/>
           </p:cNvPicPr>
-          <p:nvPr>
-            <p:ph idx="1"/>
-          </p:nvPr>
+          <p:nvPr/>
         </p:nvPicPr>
         <p:blipFill>
           <a:blip r:embed="rId2"/>
@@ -4735,15 +4763,18 @@
         </p:blipFill>
         <p:spPr>
           <a:xfrm>
-            <a:off x="203637" y="2308585"/>
-            <a:ext cx="11784725" cy="2240829"/>
-          </a:xfrm>
+            <a:off x="1462087" y="941591"/>
+            <a:ext cx="9267826" cy="5403442"/>
+          </a:xfrm>
+          <a:prstGeom prst="rect">
+            <a:avLst/>
+          </a:prstGeom>
         </p:spPr>
       </p:pic>
     </p:spTree>
     <p:extLst>
       <p:ext uri="{BB962C8B-B14F-4D97-AF65-F5344CB8AC3E}">
-        <p14:creationId xmlns:p14="http://schemas.microsoft.com/office/powerpoint/2010/main" val="1431447993"/>
+        <p14:creationId xmlns:p14="http://schemas.microsoft.com/office/powerpoint/2010/main" val="1224344612"/>
       </p:ext>
     </p:extLst>
   </p:cSld>
@@ -4775,6 +4806,290 @@
           <p:cNvPr id="2" name="Título 1">
             <a:extLst>
               <a:ext uri="{FF2B5EF4-FFF2-40B4-BE49-F238E27FC236}">
+                <a16:creationId xmlns:a16="http://schemas.microsoft.com/office/drawing/2014/main" id="{94AE2C2F-C7B2-4992-9134-639AF750AD02}"/>
+              </a:ext>
+            </a:extLst>
+          </p:cNvPr>
+          <p:cNvSpPr>
+            <a:spLocks noGrp="1"/>
+          </p:cNvSpPr>
+          <p:nvPr>
+            <p:ph type="title"/>
+          </p:nvPr>
+        </p:nvSpPr>
+        <p:spPr/>
+        <p:txBody>
+          <a:bodyPr/>
+          <a:lstStyle/>
+          <a:p>
+            <a:r>
+              <a:rPr lang="en-US" dirty="0"/>
+              <a:t>Base de </a:t>
+            </a:r>
+            <a:r>
+              <a:rPr lang="en-US" dirty="0" err="1"/>
+              <a:t>Datos</a:t>
+            </a:r>
+            <a:r>
+              <a:rPr lang="en-US" dirty="0"/>
+              <a:t> – </a:t>
+            </a:r>
+            <a:r>
+              <a:rPr lang="en-US" dirty="0" err="1"/>
+              <a:t>Tabla</a:t>
+            </a:r>
+            <a:r>
+              <a:rPr lang="en-US" dirty="0"/>
+              <a:t> Cate</a:t>
+            </a:r>
+            <a:r>
+              <a:rPr lang="es-EC" dirty="0" err="1"/>
+              <a:t>goría</a:t>
+            </a:r>
+            <a:endParaRPr lang="en-US" dirty="0"/>
+          </a:p>
+        </p:txBody>
+      </p:sp>
+      <p:pic>
+        <p:nvPicPr>
+          <p:cNvPr id="5" name="Marcador de contenido 4">
+            <a:extLst>
+              <a:ext uri="{FF2B5EF4-FFF2-40B4-BE49-F238E27FC236}">
+                <a16:creationId xmlns:a16="http://schemas.microsoft.com/office/drawing/2014/main" id="{F26CDB12-F284-4EDA-A0D0-83D276154032}"/>
+              </a:ext>
+            </a:extLst>
+          </p:cNvPr>
+          <p:cNvPicPr>
+            <a:picLocks noGrp="1" noChangeAspect="1"/>
+          </p:cNvPicPr>
+          <p:nvPr>
+            <p:ph idx="1"/>
+          </p:nvPr>
+        </p:nvPicPr>
+        <p:blipFill>
+          <a:blip r:embed="rId2"/>
+          <a:stretch>
+            <a:fillRect/>
+          </a:stretch>
+        </p:blipFill>
+        <p:spPr>
+          <a:xfrm>
+            <a:off x="837969" y="2081264"/>
+            <a:ext cx="10516061" cy="3541922"/>
+          </a:xfrm>
+        </p:spPr>
+      </p:pic>
+    </p:spTree>
+    <p:extLst>
+      <p:ext uri="{BB962C8B-B14F-4D97-AF65-F5344CB8AC3E}">
+        <p14:creationId xmlns:p14="http://schemas.microsoft.com/office/powerpoint/2010/main" val="2477289466"/>
+      </p:ext>
+    </p:extLst>
+  </p:cSld>
+  <p:clrMapOvr>
+    <a:masterClrMapping/>
+  </p:clrMapOvr>
+</p:sld>
+</file>
+
+<file path=ppt/slides/slide12.xml><?xml version="1.0" encoding="utf-8"?>
+<p:sld xmlns:a="http://schemas.openxmlformats.org/drawingml/2006/main" xmlns:r="http://schemas.openxmlformats.org/officeDocument/2006/relationships" xmlns:p="http://schemas.openxmlformats.org/presentationml/2006/main">
+  <p:cSld>
+    <p:spTree>
+      <p:nvGrpSpPr>
+        <p:cNvPr id="1" name=""/>
+        <p:cNvGrpSpPr/>
+        <p:nvPr/>
+      </p:nvGrpSpPr>
+      <p:grpSpPr>
+        <a:xfrm>
+          <a:off x="0" y="0"/>
+          <a:ext cx="0" cy="0"/>
+          <a:chOff x="0" y="0"/>
+          <a:chExt cx="0" cy="0"/>
+        </a:xfrm>
+      </p:grpSpPr>
+      <p:sp>
+        <p:nvSpPr>
+          <p:cNvPr id="2" name="Título 1">
+            <a:extLst>
+              <a:ext uri="{FF2B5EF4-FFF2-40B4-BE49-F238E27FC236}">
+                <a16:creationId xmlns:a16="http://schemas.microsoft.com/office/drawing/2014/main" id="{ACA11B8A-AF06-4550-9D03-CF5F31ED266F}"/>
+              </a:ext>
+            </a:extLst>
+          </p:cNvPr>
+          <p:cNvSpPr>
+            <a:spLocks noGrp="1"/>
+          </p:cNvSpPr>
+          <p:nvPr>
+            <p:ph type="title"/>
+          </p:nvPr>
+        </p:nvSpPr>
+        <p:spPr/>
+        <p:txBody>
+          <a:bodyPr/>
+          <a:lstStyle/>
+          <a:p>
+            <a:r>
+              <a:rPr lang="es-EC" dirty="0"/>
+              <a:t>Tabla Cliente</a:t>
+            </a:r>
+            <a:endParaRPr lang="en-US" dirty="0"/>
+          </a:p>
+        </p:txBody>
+      </p:sp>
+      <p:pic>
+        <p:nvPicPr>
+          <p:cNvPr id="5" name="Marcador de contenido 4">
+            <a:extLst>
+              <a:ext uri="{FF2B5EF4-FFF2-40B4-BE49-F238E27FC236}">
+                <a16:creationId xmlns:a16="http://schemas.microsoft.com/office/drawing/2014/main" id="{F7F88C19-6BC4-4A15-90DF-C8926D856E73}"/>
+              </a:ext>
+            </a:extLst>
+          </p:cNvPr>
+          <p:cNvPicPr>
+            <a:picLocks noGrp="1" noChangeAspect="1"/>
+          </p:cNvPicPr>
+          <p:nvPr>
+            <p:ph idx="1"/>
+          </p:nvPr>
+        </p:nvPicPr>
+        <p:blipFill>
+          <a:blip r:embed="rId2"/>
+          <a:stretch>
+            <a:fillRect/>
+          </a:stretch>
+        </p:blipFill>
+        <p:spPr>
+          <a:xfrm>
+            <a:off x="86649" y="2542509"/>
+            <a:ext cx="12018702" cy="1772982"/>
+          </a:xfrm>
+        </p:spPr>
+      </p:pic>
+    </p:spTree>
+    <p:extLst>
+      <p:ext uri="{BB962C8B-B14F-4D97-AF65-F5344CB8AC3E}">
+        <p14:creationId xmlns:p14="http://schemas.microsoft.com/office/powerpoint/2010/main" val="1597733831"/>
+      </p:ext>
+    </p:extLst>
+  </p:cSld>
+  <p:clrMapOvr>
+    <a:masterClrMapping/>
+  </p:clrMapOvr>
+</p:sld>
+</file>
+
+<file path=ppt/slides/slide13.xml><?xml version="1.0" encoding="utf-8"?>
+<p:sld xmlns:a="http://schemas.openxmlformats.org/drawingml/2006/main" xmlns:r="http://schemas.openxmlformats.org/officeDocument/2006/relationships" xmlns:p="http://schemas.openxmlformats.org/presentationml/2006/main">
+  <p:cSld>
+    <p:spTree>
+      <p:nvGrpSpPr>
+        <p:cNvPr id="1" name=""/>
+        <p:cNvGrpSpPr/>
+        <p:nvPr/>
+      </p:nvGrpSpPr>
+      <p:grpSpPr>
+        <a:xfrm>
+          <a:off x="0" y="0"/>
+          <a:ext cx="0" cy="0"/>
+          <a:chOff x="0" y="0"/>
+          <a:chExt cx="0" cy="0"/>
+        </a:xfrm>
+      </p:grpSpPr>
+      <p:sp>
+        <p:nvSpPr>
+          <p:cNvPr id="2" name="Título 1">
+            <a:extLst>
+              <a:ext uri="{FF2B5EF4-FFF2-40B4-BE49-F238E27FC236}">
+                <a16:creationId xmlns:a16="http://schemas.microsoft.com/office/drawing/2014/main" id="{A43BFA35-14AD-4AEC-A65A-30BCEDAD337D}"/>
+              </a:ext>
+            </a:extLst>
+          </p:cNvPr>
+          <p:cNvSpPr>
+            <a:spLocks noGrp="1"/>
+          </p:cNvSpPr>
+          <p:nvPr>
+            <p:ph type="title"/>
+          </p:nvPr>
+        </p:nvSpPr>
+        <p:spPr/>
+        <p:txBody>
+          <a:bodyPr/>
+          <a:lstStyle/>
+          <a:p>
+            <a:r>
+              <a:rPr lang="es-EC" dirty="0"/>
+              <a:t>Tabla Factura</a:t>
+            </a:r>
+            <a:endParaRPr lang="en-US" dirty="0"/>
+          </a:p>
+        </p:txBody>
+      </p:sp>
+      <p:pic>
+        <p:nvPicPr>
+          <p:cNvPr id="5" name="Marcador de contenido 4">
+            <a:extLst>
+              <a:ext uri="{FF2B5EF4-FFF2-40B4-BE49-F238E27FC236}">
+                <a16:creationId xmlns:a16="http://schemas.microsoft.com/office/drawing/2014/main" id="{685A1BAB-DC8F-4289-80D0-EAA1EFAC31C2}"/>
+              </a:ext>
+            </a:extLst>
+          </p:cNvPr>
+          <p:cNvPicPr>
+            <a:picLocks noGrp="1" noChangeAspect="1"/>
+          </p:cNvPicPr>
+          <p:nvPr>
+            <p:ph idx="1"/>
+          </p:nvPr>
+        </p:nvPicPr>
+        <p:blipFill>
+          <a:blip r:embed="rId2"/>
+          <a:stretch>
+            <a:fillRect/>
+          </a:stretch>
+        </p:blipFill>
+        <p:spPr>
+          <a:xfrm>
+            <a:off x="203637" y="2308585"/>
+            <a:ext cx="11784725" cy="2240829"/>
+          </a:xfrm>
+        </p:spPr>
+      </p:pic>
+    </p:spTree>
+    <p:extLst>
+      <p:ext uri="{BB962C8B-B14F-4D97-AF65-F5344CB8AC3E}">
+        <p14:creationId xmlns:p14="http://schemas.microsoft.com/office/powerpoint/2010/main" val="1431447993"/>
+      </p:ext>
+    </p:extLst>
+  </p:cSld>
+  <p:clrMapOvr>
+    <a:masterClrMapping/>
+  </p:clrMapOvr>
+</p:sld>
+</file>
+
+<file path=ppt/slides/slide14.xml><?xml version="1.0" encoding="utf-8"?>
+<p:sld xmlns:a="http://schemas.openxmlformats.org/drawingml/2006/main" xmlns:r="http://schemas.openxmlformats.org/officeDocument/2006/relationships" xmlns:p="http://schemas.openxmlformats.org/presentationml/2006/main">
+  <p:cSld>
+    <p:spTree>
+      <p:nvGrpSpPr>
+        <p:cNvPr id="1" name=""/>
+        <p:cNvGrpSpPr/>
+        <p:nvPr/>
+      </p:nvGrpSpPr>
+      <p:grpSpPr>
+        <a:xfrm>
+          <a:off x="0" y="0"/>
+          <a:ext cx="0" cy="0"/>
+          <a:chOff x="0" y="0"/>
+          <a:chExt cx="0" cy="0"/>
+        </a:xfrm>
+      </p:grpSpPr>
+      <p:sp>
+        <p:nvSpPr>
+          <p:cNvPr id="2" name="Título 1">
+            <a:extLst>
+              <a:ext uri="{FF2B5EF4-FFF2-40B4-BE49-F238E27FC236}">
                 <a16:creationId xmlns:a16="http://schemas.microsoft.com/office/drawing/2014/main" id="{4EF60D84-F679-4D25-8D43-72FC8AD4B1B8}"/>
               </a:ext>
             </a:extLst>
@@ -4841,7 +5156,7 @@
 </p:sld>
 </file>
 
-<file path=ppt/slides/slide12.xml><?xml version="1.0" encoding="utf-8"?>
+<file path=ppt/slides/slide15.xml><?xml version="1.0" encoding="utf-8"?>
 <p:sld xmlns:a="http://schemas.openxmlformats.org/drawingml/2006/main" xmlns:r="http://schemas.openxmlformats.org/officeDocument/2006/relationships" xmlns:p="http://schemas.openxmlformats.org/presentationml/2006/main">
   <p:cSld>
     <p:spTree>
@@ -5007,7 +5322,7 @@
 </p:sld>
 </file>
 
-<file path=ppt/slides/slide13.xml><?xml version="1.0" encoding="utf-8"?>
+<file path=ppt/slides/slide16.xml><?xml version="1.0" encoding="utf-8"?>
 <p:sld xmlns:a="http://schemas.openxmlformats.org/drawingml/2006/main" xmlns:r="http://schemas.openxmlformats.org/officeDocument/2006/relationships" xmlns:p="http://schemas.openxmlformats.org/presentationml/2006/main">
   <p:cSld>
     <p:spTree>
@@ -5266,7 +5581,7 @@
 </p:sld>
 </file>
 
-<file path=ppt/slides/slide14.xml><?xml version="1.0" encoding="utf-8"?>
+<file path=ppt/slides/slide17.xml><?xml version="1.0" encoding="utf-8"?>
 <p:sld xmlns:a="http://schemas.openxmlformats.org/drawingml/2006/main" xmlns:r="http://schemas.openxmlformats.org/officeDocument/2006/relationships" xmlns:p="http://schemas.openxmlformats.org/presentationml/2006/main">
   <p:cSld>
     <p:spTree>
@@ -5326,7 +5641,7 @@
 </p:sld>
 </file>
 
-<file path=ppt/slides/slide15.xml><?xml version="1.0" encoding="utf-8"?>
+<file path=ppt/slides/slide18.xml><?xml version="1.0" encoding="utf-8"?>
 <p:sld xmlns:a="http://schemas.openxmlformats.org/drawingml/2006/main" xmlns:r="http://schemas.openxmlformats.org/officeDocument/2006/relationships" xmlns:p="http://schemas.openxmlformats.org/presentationml/2006/main">
   <p:cSld>
     <p:spTree>
@@ -6587,48 +6902,55 @@
       </p:grpSpPr>
       <p:sp>
         <p:nvSpPr>
-          <p:cNvPr id="2" name="Título 1">
-            <a:extLst>
-              <a:ext uri="{FF2B5EF4-FFF2-40B4-BE49-F238E27FC236}">
-                <a16:creationId xmlns:a16="http://schemas.microsoft.com/office/drawing/2014/main" id="{94AE2C2F-C7B2-4992-9134-639AF750AD02}"/>
-              </a:ext>
-            </a:extLst>
-          </p:cNvPr>
-          <p:cNvSpPr>
-            <a:spLocks noGrp="1"/>
-          </p:cNvSpPr>
-          <p:nvPr>
-            <p:ph type="title"/>
-          </p:nvPr>
-        </p:nvSpPr>
-        <p:spPr/>
+          <p:cNvPr id="2" name="Title 1">
+            <a:extLst>
+              <a:ext uri="{FF2B5EF4-FFF2-40B4-BE49-F238E27FC236}">
+                <a16:creationId xmlns:a16="http://schemas.microsoft.com/office/drawing/2014/main" id="{451A2D0B-9750-4098-A51F-10A0644B19DA}"/>
+              </a:ext>
+            </a:extLst>
+          </p:cNvPr>
+          <p:cNvSpPr txBox="1">
+            <a:spLocks/>
+          </p:cNvSpPr>
+          <p:nvPr/>
+        </p:nvSpPr>
+        <p:spPr>
+          <a:xfrm>
+            <a:off x="225743" y="215166"/>
+            <a:ext cx="10058400" cy="570647"/>
+          </a:xfrm>
+          <a:prstGeom prst="rect">
+            <a:avLst/>
+          </a:prstGeom>
+        </p:spPr>
         <p:txBody>
           <a:bodyPr/>
-          <a:lstStyle/>
-          <a:p>
-            <a:r>
-              <a:rPr lang="en-US" dirty="0"/>
-              <a:t>Base de </a:t>
-            </a:r>
-            <a:r>
-              <a:rPr lang="en-US" dirty="0" err="1"/>
-              <a:t>Datos</a:t>
-            </a:r>
-            <a:r>
-              <a:rPr lang="en-US" dirty="0"/>
-              <a:t> – </a:t>
-            </a:r>
-            <a:r>
-              <a:rPr lang="en-US" dirty="0" err="1"/>
-              <a:t>Tabla</a:t>
-            </a:r>
-            <a:r>
-              <a:rPr lang="en-US" dirty="0"/>
-              <a:t> Cate</a:t>
-            </a:r>
-            <a:r>
-              <a:rPr lang="es-EC" dirty="0" err="1"/>
-              <a:t>goría</a:t>
+          <a:lstStyle>
+            <a:lvl1pPr algn="l" defTabSz="914400" rtl="0" eaLnBrk="1" latinLnBrk="0" hangingPunct="1">
+              <a:lnSpc>
+                <a:spcPct val="90000"/>
+              </a:lnSpc>
+              <a:spcBef>
+                <a:spcPct val="0"/>
+              </a:spcBef>
+              <a:buNone/>
+              <a:defRPr sz="4200" i="0" kern="1200" spc="-50" baseline="0">
+                <a:solidFill>
+                  <a:schemeClr val="tx1">
+                    <a:lumMod val="75000"/>
+                    <a:lumOff val="25000"/>
+                  </a:schemeClr>
+                </a:solidFill>
+                <a:latin typeface="+mj-lt"/>
+                <a:ea typeface="+mj-ea"/>
+                <a:cs typeface="+mj-cs"/>
+              </a:defRPr>
+            </a:lvl1pPr>
+          </a:lstStyle>
+          <a:p>
+            <a:r>
+              <a:rPr lang="es-ES" dirty="0"/>
+              <a:t>Modelo conceptual de la base de datos</a:t>
             </a:r>
             <a:endParaRPr lang="en-US" dirty="0"/>
           </a:p>
@@ -6636,19 +6958,17 @@
       </p:sp>
       <p:pic>
         <p:nvPicPr>
-          <p:cNvPr id="5" name="Marcador de contenido 4">
-            <a:extLst>
-              <a:ext uri="{FF2B5EF4-FFF2-40B4-BE49-F238E27FC236}">
-                <a16:creationId xmlns:a16="http://schemas.microsoft.com/office/drawing/2014/main" id="{F26CDB12-F284-4EDA-A0D0-83D276154032}"/>
+          <p:cNvPr id="4" name="Imagen 3">
+            <a:extLst>
+              <a:ext uri="{FF2B5EF4-FFF2-40B4-BE49-F238E27FC236}">
+                <a16:creationId xmlns:a16="http://schemas.microsoft.com/office/drawing/2014/main" id="{C466E759-4F07-4793-BFD6-19C11217C4BB}"/>
               </a:ext>
             </a:extLst>
           </p:cNvPr>
           <p:cNvPicPr>
-            <a:picLocks noGrp="1" noChangeAspect="1"/>
+            <a:picLocks noChangeAspect="1"/>
           </p:cNvPicPr>
-          <p:nvPr>
-            <p:ph idx="1"/>
-          </p:nvPr>
+          <p:nvPr/>
         </p:nvPicPr>
         <p:blipFill>
           <a:blip r:embed="rId2"/>
@@ -6658,15 +6978,18 @@
         </p:blipFill>
         <p:spPr>
           <a:xfrm>
-            <a:off x="837969" y="2081264"/>
-            <a:ext cx="10516061" cy="3541922"/>
-          </a:xfrm>
+            <a:off x="962025" y="785813"/>
+            <a:ext cx="10267950" cy="5470566"/>
+          </a:xfrm>
+          <a:prstGeom prst="rect">
+            <a:avLst/>
+          </a:prstGeom>
         </p:spPr>
       </p:pic>
     </p:spTree>
     <p:extLst>
       <p:ext uri="{BB962C8B-B14F-4D97-AF65-F5344CB8AC3E}">
-        <p14:creationId xmlns:p14="http://schemas.microsoft.com/office/powerpoint/2010/main" val="2477289466"/>
+        <p14:creationId xmlns:p14="http://schemas.microsoft.com/office/powerpoint/2010/main" val="3622847969"/>
       </p:ext>
     </p:extLst>
   </p:cSld>
@@ -6695,28 +7018,55 @@
       </p:grpSpPr>
       <p:sp>
         <p:nvSpPr>
-          <p:cNvPr id="2" name="Título 1">
-            <a:extLst>
-              <a:ext uri="{FF2B5EF4-FFF2-40B4-BE49-F238E27FC236}">
-                <a16:creationId xmlns:a16="http://schemas.microsoft.com/office/drawing/2014/main" id="{ACA11B8A-AF06-4550-9D03-CF5F31ED266F}"/>
-              </a:ext>
-            </a:extLst>
-          </p:cNvPr>
-          <p:cNvSpPr>
-            <a:spLocks noGrp="1"/>
-          </p:cNvSpPr>
-          <p:nvPr>
-            <p:ph type="title"/>
-          </p:nvPr>
-        </p:nvSpPr>
-        <p:spPr/>
+          <p:cNvPr id="2" name="Title 1">
+            <a:extLst>
+              <a:ext uri="{FF2B5EF4-FFF2-40B4-BE49-F238E27FC236}">
+                <a16:creationId xmlns:a16="http://schemas.microsoft.com/office/drawing/2014/main" id="{433603AC-6339-4A5A-A2FE-9CAD5125D150}"/>
+              </a:ext>
+            </a:extLst>
+          </p:cNvPr>
+          <p:cNvSpPr txBox="1">
+            <a:spLocks/>
+          </p:cNvSpPr>
+          <p:nvPr/>
+        </p:nvSpPr>
+        <p:spPr>
+          <a:xfrm>
+            <a:off x="225743" y="215166"/>
+            <a:ext cx="10058400" cy="570647"/>
+          </a:xfrm>
+          <a:prstGeom prst="rect">
+            <a:avLst/>
+          </a:prstGeom>
+        </p:spPr>
         <p:txBody>
           <a:bodyPr/>
-          <a:lstStyle/>
-          <a:p>
-            <a:r>
-              <a:rPr lang="es-EC" dirty="0"/>
-              <a:t>Tabla Cliente</a:t>
+          <a:lstStyle>
+            <a:lvl1pPr algn="l" defTabSz="914400" rtl="0" eaLnBrk="1" latinLnBrk="0" hangingPunct="1">
+              <a:lnSpc>
+                <a:spcPct val="90000"/>
+              </a:lnSpc>
+              <a:spcBef>
+                <a:spcPct val="0"/>
+              </a:spcBef>
+              <a:buNone/>
+              <a:defRPr sz="4200" i="0" kern="1200" spc="-50" baseline="0">
+                <a:solidFill>
+                  <a:schemeClr val="tx1">
+                    <a:lumMod val="75000"/>
+                    <a:lumOff val="25000"/>
+                  </a:schemeClr>
+                </a:solidFill>
+                <a:latin typeface="+mj-lt"/>
+                <a:ea typeface="+mj-ea"/>
+                <a:cs typeface="+mj-cs"/>
+              </a:defRPr>
+            </a:lvl1pPr>
+          </a:lstStyle>
+          <a:p>
+            <a:r>
+              <a:rPr lang="es-ES" dirty="0"/>
+              <a:t>Modelo lógico de la base de datos</a:t>
             </a:r>
             <a:endParaRPr lang="en-US" dirty="0"/>
           </a:p>
@@ -6724,19 +7074,17 @@
       </p:sp>
       <p:pic>
         <p:nvPicPr>
-          <p:cNvPr id="5" name="Marcador de contenido 4">
-            <a:extLst>
-              <a:ext uri="{FF2B5EF4-FFF2-40B4-BE49-F238E27FC236}">
-                <a16:creationId xmlns:a16="http://schemas.microsoft.com/office/drawing/2014/main" id="{F7F88C19-6BC4-4A15-90DF-C8926D856E73}"/>
+          <p:cNvPr id="4" name="Imagen 3">
+            <a:extLst>
+              <a:ext uri="{FF2B5EF4-FFF2-40B4-BE49-F238E27FC236}">
+                <a16:creationId xmlns:a16="http://schemas.microsoft.com/office/drawing/2014/main" id="{4FAAD76E-AB07-40CA-93B0-5692A2310696}"/>
               </a:ext>
             </a:extLst>
           </p:cNvPr>
           <p:cNvPicPr>
-            <a:picLocks noGrp="1" noChangeAspect="1"/>
+            <a:picLocks noChangeAspect="1"/>
           </p:cNvPicPr>
-          <p:nvPr>
-            <p:ph idx="1"/>
-          </p:nvPr>
+          <p:nvPr/>
         </p:nvPicPr>
         <p:blipFill>
           <a:blip r:embed="rId2"/>
@@ -6746,15 +7094,18 @@
         </p:blipFill>
         <p:spPr>
           <a:xfrm>
-            <a:off x="86649" y="2542509"/>
-            <a:ext cx="12018702" cy="1772982"/>
-          </a:xfrm>
+            <a:off x="786405" y="785813"/>
+            <a:ext cx="10619189" cy="5600699"/>
+          </a:xfrm>
+          <a:prstGeom prst="rect">
+            <a:avLst/>
+          </a:prstGeom>
         </p:spPr>
       </p:pic>
     </p:spTree>
     <p:extLst>
       <p:ext uri="{BB962C8B-B14F-4D97-AF65-F5344CB8AC3E}">
-        <p14:creationId xmlns:p14="http://schemas.microsoft.com/office/powerpoint/2010/main" val="1597733831"/>
+        <p14:creationId xmlns:p14="http://schemas.microsoft.com/office/powerpoint/2010/main" val="2548689083"/>
       </p:ext>
     </p:extLst>
   </p:cSld>

</xml_diff>